<commit_message>
Updated Use Case Sources & Images
Per decision to make the examples non-technology specific (e.g., no NTP or SDC).
</commit_message>
<xml_diff>
--- a/SDPi_Supplement/sources/vol1-diagram-use-case-aars-tech-view.pptx
+++ b/SDPi_Supplement/sources/vol1-diagram-use-case-aars-tech-view.pptx
@@ -246,7 +246,7 @@
       <p15:sldGuideLst xmlns:p15="http://schemas.microsoft.com/office/powerpoint/2012/main"/>
     </p:ext>
     <p:ext uri="http://customooxmlschemas.google.com/">
-      <go:slidesCustomData xmlns:go="http://customooxmlschemas.google.com/" xmlns:ahyp="http://schemas.microsoft.com/office/drawing/2018/hyperlinkcolor" xmlns:p15="http://schemas.microsoft.com/office/powerpoint/2012/main" xmlns:p14="http://schemas.microsoft.com/office/powerpoint/2010/main" xmlns:com="http://schemas.openxmlformats.org/drawingml/2006/compatibility" xmlns:pvml="urn:schemas-microsoft-com:office:powerpoint" xmlns:v="urn:schemas-microsoft-com:vml" xmlns:o="urn:schemas-microsoft-com:office:office" xmlns:dgm="http://schemas.openxmlformats.org/drawingml/2006/diagram" xmlns:c="http://schemas.openxmlformats.org/drawingml/2006/chart" xmlns:mv="urn:schemas-microsoft-com:mac:vml" xmlns:mc="http://schemas.openxmlformats.org/markup-compatibility/2006" xmlns="" r:id="rId21" roundtripDataSignature="AMtx7mioXqX06bVoM2NZpyvmQ4oN2c7f2Q=="/>
+      <go:slidesCustomData xmlns="" xmlns:mc="http://schemas.openxmlformats.org/markup-compatibility/2006" xmlns:mv="urn:schemas-microsoft-com:mac:vml" xmlns:c="http://schemas.openxmlformats.org/drawingml/2006/chart" xmlns:dgm="http://schemas.openxmlformats.org/drawingml/2006/diagram" xmlns:o="urn:schemas-microsoft-com:office:office" xmlns:v="urn:schemas-microsoft-com:vml" xmlns:pvml="urn:schemas-microsoft-com:office:powerpoint" xmlns:com="http://schemas.openxmlformats.org/drawingml/2006/compatibility" xmlns:p14="http://schemas.microsoft.com/office/powerpoint/2010/main" xmlns:p15="http://schemas.microsoft.com/office/powerpoint/2012/main" xmlns:ahyp="http://schemas.microsoft.com/office/drawing/2018/hyperlinkcolor" xmlns:go="http://customooxmlschemas.google.com/" r:id="rId21" roundtripDataSignature="AMtx7mioXqX06bVoM2NZpyvmQ4oN2c7f2Q=="/>
     </p:ext>
   </p:extLst>
 </p:presentation>
@@ -10748,7 +10748,7 @@
                 <a:cs typeface="Calibri"/>
                 <a:sym typeface="Calibri"/>
               </a:rPr>
-              <a:t>SDC LAN</a:t>
+              <a:t>MD LAN</a:t>
             </a:r>
             <a:endParaRPr dirty="0"/>
           </a:p>

</xml_diff>